<commit_message>
Modified self test for PredicatesSelfTest
</commit_message>
<xml_diff>
--- a/Predicates/PredicatesSelfTests.pptx
+++ b/Predicates/PredicatesSelfTests.pptx
@@ -8,6 +8,7 @@
     <p:sldId id="256" r:id="rId2"/>
     <p:sldId id="257" r:id="rId3"/>
     <p:sldId id="258" r:id="rId4"/>
+    <p:sldId id="259" r:id="rId5"/>
   </p:sldIdLst>
   <p:sldSz cx="9144000" cy="6858000" type="screen4x3"/>
   <p:notesSz cx="6858000" cy="9144000"/>
@@ -290,7 +291,7 @@
           <a:p>
             <a:fld id="{814ACC10-CA83-E34D-B137-B26B97AF16D9}" type="datetimeFigureOut">
               <a:rPr lang="en-US" smtClean="0"/>
-              <a:t>8/27/21</a:t>
+              <a:t>9/9/21</a:t>
             </a:fld>
             <a:endParaRPr lang="en-US"/>
           </a:p>
@@ -460,7 +461,7 @@
           <a:p>
             <a:fld id="{814ACC10-CA83-E34D-B137-B26B97AF16D9}" type="datetimeFigureOut">
               <a:rPr lang="en-US" smtClean="0"/>
-              <a:t>8/27/21</a:t>
+              <a:t>9/9/21</a:t>
             </a:fld>
             <a:endParaRPr lang="en-US"/>
           </a:p>
@@ -640,7 +641,7 @@
           <a:p>
             <a:fld id="{814ACC10-CA83-E34D-B137-B26B97AF16D9}" type="datetimeFigureOut">
               <a:rPr lang="en-US" smtClean="0"/>
-              <a:t>8/27/21</a:t>
+              <a:t>9/9/21</a:t>
             </a:fld>
             <a:endParaRPr lang="en-US"/>
           </a:p>
@@ -810,7 +811,7 @@
           <a:p>
             <a:fld id="{814ACC10-CA83-E34D-B137-B26B97AF16D9}" type="datetimeFigureOut">
               <a:rPr lang="en-US" smtClean="0"/>
-              <a:t>8/27/21</a:t>
+              <a:t>9/9/21</a:t>
             </a:fld>
             <a:endParaRPr lang="en-US"/>
           </a:p>
@@ -1056,7 +1057,7 @@
           <a:p>
             <a:fld id="{814ACC10-CA83-E34D-B137-B26B97AF16D9}" type="datetimeFigureOut">
               <a:rPr lang="en-US" smtClean="0"/>
-              <a:t>8/27/21</a:t>
+              <a:t>9/9/21</a:t>
             </a:fld>
             <a:endParaRPr lang="en-US"/>
           </a:p>
@@ -1344,7 +1345,7 @@
           <a:p>
             <a:fld id="{814ACC10-CA83-E34D-B137-B26B97AF16D9}" type="datetimeFigureOut">
               <a:rPr lang="en-US" smtClean="0"/>
-              <a:t>8/27/21</a:t>
+              <a:t>9/9/21</a:t>
             </a:fld>
             <a:endParaRPr lang="en-US"/>
           </a:p>
@@ -1766,7 +1767,7 @@
           <a:p>
             <a:fld id="{814ACC10-CA83-E34D-B137-B26B97AF16D9}" type="datetimeFigureOut">
               <a:rPr lang="en-US" smtClean="0"/>
-              <a:t>8/27/21</a:t>
+              <a:t>9/9/21</a:t>
             </a:fld>
             <a:endParaRPr lang="en-US"/>
           </a:p>
@@ -1884,7 +1885,7 @@
           <a:p>
             <a:fld id="{814ACC10-CA83-E34D-B137-B26B97AF16D9}" type="datetimeFigureOut">
               <a:rPr lang="en-US" smtClean="0"/>
-              <a:t>8/27/21</a:t>
+              <a:t>9/9/21</a:t>
             </a:fld>
             <a:endParaRPr lang="en-US"/>
           </a:p>
@@ -1979,7 +1980,7 @@
           <a:p>
             <a:fld id="{814ACC10-CA83-E34D-B137-B26B97AF16D9}" type="datetimeFigureOut">
               <a:rPr lang="en-US" smtClean="0"/>
-              <a:t>8/27/21</a:t>
+              <a:t>9/9/21</a:t>
             </a:fld>
             <a:endParaRPr lang="en-US"/>
           </a:p>
@@ -2256,7 +2257,7 @@
           <a:p>
             <a:fld id="{814ACC10-CA83-E34D-B137-B26B97AF16D9}" type="datetimeFigureOut">
               <a:rPr lang="en-US" smtClean="0"/>
-              <a:t>8/27/21</a:t>
+              <a:t>9/9/21</a:t>
             </a:fld>
             <a:endParaRPr lang="en-US"/>
           </a:p>
@@ -2509,7 +2510,7 @@
           <a:p>
             <a:fld id="{814ACC10-CA83-E34D-B137-B26B97AF16D9}" type="datetimeFigureOut">
               <a:rPr lang="en-US" smtClean="0"/>
-              <a:t>8/27/21</a:t>
+              <a:t>9/9/21</a:t>
             </a:fld>
             <a:endParaRPr lang="en-US"/>
           </a:p>
@@ -2722,7 +2723,7 @@
           <a:p>
             <a:fld id="{814ACC10-CA83-E34D-B137-B26B97AF16D9}" type="datetimeFigureOut">
               <a:rPr lang="en-US" smtClean="0"/>
-              <a:t>8/27/21</a:t>
+              <a:t>9/9/21</a:t>
             </a:fld>
             <a:endParaRPr lang="en-US"/>
           </a:p>
@@ -5760,6 +5761,530 @@
     <p:extLst>
       <p:ext uri="{BB962C8B-B14F-4D97-AF65-F5344CB8AC3E}">
         <p14:creationId xmlns:p14="http://schemas.microsoft.com/office/powerpoint/2010/main" val="3521419407"/>
+      </p:ext>
+    </p:extLst>
+  </p:cSld>
+  <p:clrMapOvr>
+    <a:masterClrMapping/>
+  </p:clrMapOvr>
+</p:sld>
+</file>
+
+<file path=ppt/slides/slide4.xml><?xml version="1.0" encoding="utf-8"?>
+<p:sld xmlns:a="http://schemas.openxmlformats.org/drawingml/2006/main" xmlns:r="http://schemas.openxmlformats.org/officeDocument/2006/relationships" xmlns:p="http://schemas.openxmlformats.org/presentationml/2006/main">
+  <p:cSld>
+    <p:spTree>
+      <p:nvGrpSpPr>
+        <p:cNvPr id="1" name=""/>
+        <p:cNvGrpSpPr/>
+        <p:nvPr/>
+      </p:nvGrpSpPr>
+      <p:grpSpPr>
+        <a:xfrm>
+          <a:off x="0" y="0"/>
+          <a:ext cx="0" cy="0"/>
+          <a:chOff x="0" y="0"/>
+          <a:chExt cx="0" cy="0"/>
+        </a:xfrm>
+      </p:grpSpPr>
+      <p:sp>
+        <p:nvSpPr>
+          <p:cNvPr id="2" name="Rectangle 1"/>
+          <p:cNvSpPr/>
+          <p:nvPr/>
+        </p:nvSpPr>
+        <p:spPr>
+          <a:xfrm>
+            <a:off x="2288617" y="1674810"/>
+            <a:ext cx="4395818" cy="3670627"/>
+          </a:xfrm>
+          <a:prstGeom prst="rect">
+            <a:avLst/>
+          </a:prstGeom>
+        </p:spPr>
+        <p:style>
+          <a:lnRef idx="1">
+            <a:schemeClr val="accent1"/>
+          </a:lnRef>
+          <a:fillRef idx="3">
+            <a:schemeClr val="accent1"/>
+          </a:fillRef>
+          <a:effectRef idx="2">
+            <a:schemeClr val="accent1"/>
+          </a:effectRef>
+          <a:fontRef idx="minor">
+            <a:schemeClr val="lt1"/>
+          </a:fontRef>
+        </p:style>
+        <p:txBody>
+          <a:bodyPr rtlCol="0" anchor="ctr"/>
+          <a:lstStyle/>
+          <a:p>
+            <a:pPr algn="ctr"/>
+            <a:endParaRPr lang="en-US"/>
+          </a:p>
+        </p:txBody>
+      </p:sp>
+      <p:sp>
+        <p:nvSpPr>
+          <p:cNvPr id="3" name="Rectangle 2"/>
+          <p:cNvSpPr/>
+          <p:nvPr/>
+        </p:nvSpPr>
+        <p:spPr>
+          <a:xfrm>
+            <a:off x="2958456" y="2777393"/>
+            <a:ext cx="1709833" cy="1577113"/>
+          </a:xfrm>
+          <a:prstGeom prst="rect">
+            <a:avLst/>
+          </a:prstGeom>
+          <a:solidFill>
+            <a:srgbClr val="FFFF00"/>
+          </a:solidFill>
+        </p:spPr>
+        <p:style>
+          <a:lnRef idx="1">
+            <a:schemeClr val="accent1"/>
+          </a:lnRef>
+          <a:fillRef idx="3">
+            <a:schemeClr val="accent1"/>
+          </a:fillRef>
+          <a:effectRef idx="2">
+            <a:schemeClr val="accent1"/>
+          </a:effectRef>
+          <a:fontRef idx="minor">
+            <a:schemeClr val="lt1"/>
+          </a:fontRef>
+        </p:style>
+        <p:txBody>
+          <a:bodyPr rtlCol="0" anchor="ctr"/>
+          <a:lstStyle/>
+          <a:p>
+            <a:pPr algn="ctr"/>
+            <a:endParaRPr lang="en-US" dirty="0"/>
+          </a:p>
+        </p:txBody>
+      </p:sp>
+      <p:sp>
+        <p:nvSpPr>
+          <p:cNvPr id="4" name="Rectangle 3"/>
+          <p:cNvSpPr/>
+          <p:nvPr/>
+        </p:nvSpPr>
+        <p:spPr>
+          <a:xfrm>
+            <a:off x="3965772" y="2776267"/>
+            <a:ext cx="1709833" cy="1577113"/>
+          </a:xfrm>
+          <a:prstGeom prst="rect">
+            <a:avLst/>
+          </a:prstGeom>
+          <a:solidFill>
+            <a:srgbClr val="008000"/>
+          </a:solidFill>
+        </p:spPr>
+        <p:style>
+          <a:lnRef idx="1">
+            <a:schemeClr val="accent1"/>
+          </a:lnRef>
+          <a:fillRef idx="3">
+            <a:schemeClr val="accent1"/>
+          </a:fillRef>
+          <a:effectRef idx="2">
+            <a:schemeClr val="accent1"/>
+          </a:effectRef>
+          <a:fontRef idx="minor">
+            <a:schemeClr val="lt1"/>
+          </a:fontRef>
+        </p:style>
+        <p:txBody>
+          <a:bodyPr rtlCol="0" anchor="ctr"/>
+          <a:lstStyle/>
+          <a:p>
+            <a:pPr algn="ctr"/>
+            <a:endParaRPr lang="en-US"/>
+          </a:p>
+        </p:txBody>
+      </p:sp>
+      <p:sp>
+        <p:nvSpPr>
+          <p:cNvPr id="5" name="Rectangle 4"/>
+          <p:cNvSpPr/>
+          <p:nvPr/>
+        </p:nvSpPr>
+        <p:spPr>
+          <a:xfrm>
+            <a:off x="3965772" y="2777393"/>
+            <a:ext cx="702517" cy="1575987"/>
+          </a:xfrm>
+          <a:prstGeom prst="rect">
+            <a:avLst/>
+          </a:prstGeom>
+        </p:spPr>
+        <p:style>
+          <a:lnRef idx="1">
+            <a:schemeClr val="accent1"/>
+          </a:lnRef>
+          <a:fillRef idx="3">
+            <a:schemeClr val="accent1"/>
+          </a:fillRef>
+          <a:effectRef idx="2">
+            <a:schemeClr val="accent1"/>
+          </a:effectRef>
+          <a:fontRef idx="minor">
+            <a:schemeClr val="lt1"/>
+          </a:fontRef>
+        </p:style>
+        <p:txBody>
+          <a:bodyPr rtlCol="0" anchor="ctr"/>
+          <a:lstStyle/>
+          <a:p>
+            <a:pPr algn="ctr"/>
+            <a:endParaRPr lang="en-US"/>
+          </a:p>
+        </p:txBody>
+      </p:sp>
+      <p:sp>
+        <p:nvSpPr>
+          <p:cNvPr id="6" name="TextBox 5"/>
+          <p:cNvSpPr txBox="1"/>
+          <p:nvPr/>
+        </p:nvSpPr>
+        <p:spPr>
+          <a:xfrm>
+            <a:off x="3012275" y="3265880"/>
+            <a:ext cx="642949" cy="646331"/>
+          </a:xfrm>
+          <a:prstGeom prst="rect">
+            <a:avLst/>
+          </a:prstGeom>
+          <a:solidFill>
+            <a:srgbClr val="FFFFFF"/>
+          </a:solidFill>
+        </p:spPr>
+        <p:txBody>
+          <a:bodyPr wrap="none" rtlCol="0">
+            <a:spAutoFit/>
+          </a:bodyPr>
+          <a:lstStyle/>
+          <a:p>
+            <a:r>
+              <a:rPr lang="en-US" sz="3600" dirty="0" smtClean="0"/>
+              <a:t>CS</a:t>
+            </a:r>
+            <a:endParaRPr lang="en-US" sz="3600" dirty="0"/>
+          </a:p>
+        </p:txBody>
+      </p:sp>
+      <p:sp>
+        <p:nvSpPr>
+          <p:cNvPr id="7" name="TextBox 6"/>
+          <p:cNvSpPr txBox="1"/>
+          <p:nvPr/>
+        </p:nvSpPr>
+        <p:spPr>
+          <a:xfrm>
+            <a:off x="4782223" y="3279836"/>
+            <a:ext cx="620683" cy="646331"/>
+          </a:xfrm>
+          <a:prstGeom prst="rect">
+            <a:avLst/>
+          </a:prstGeom>
+          <a:solidFill>
+            <a:schemeClr val="bg1"/>
+          </a:solidFill>
+        </p:spPr>
+        <p:txBody>
+          <a:bodyPr wrap="none" rtlCol="0">
+            <a:spAutoFit/>
+          </a:bodyPr>
+          <a:lstStyle/>
+          <a:p>
+            <a:r>
+              <a:rPr lang="en-US" sz="3600" dirty="0" smtClean="0"/>
+              <a:t>IQ</a:t>
+            </a:r>
+            <a:endParaRPr lang="en-US" sz="3600" dirty="0"/>
+          </a:p>
+        </p:txBody>
+      </p:sp>
+      <p:sp>
+        <p:nvSpPr>
+          <p:cNvPr id="8" name="TextBox 7"/>
+          <p:cNvSpPr txBox="1"/>
+          <p:nvPr/>
+        </p:nvSpPr>
+        <p:spPr>
+          <a:xfrm>
+            <a:off x="3601330" y="201100"/>
+            <a:ext cx="2133918" cy="646331"/>
+          </a:xfrm>
+          <a:prstGeom prst="rect">
+            <a:avLst/>
+          </a:prstGeom>
+          <a:noFill/>
+        </p:spPr>
+        <p:txBody>
+          <a:bodyPr wrap="none" rtlCol="0">
+            <a:spAutoFit/>
+          </a:bodyPr>
+          <a:lstStyle/>
+          <a:p>
+            <a:r>
+              <a:rPr lang="en-US" sz="3600" dirty="0" smtClean="0"/>
+              <a:t>CS AND IQ</a:t>
+            </a:r>
+            <a:endParaRPr lang="en-US" sz="3600" dirty="0"/>
+          </a:p>
+        </p:txBody>
+      </p:sp>
+      <p:cxnSp>
+        <p:nvCxnSpPr>
+          <p:cNvPr id="10" name="Straight Arrow Connector 9"/>
+          <p:cNvCxnSpPr>
+            <a:stCxn id="8" idx="2"/>
+          </p:cNvCxnSpPr>
+          <p:nvPr/>
+        </p:nvCxnSpPr>
+        <p:spPr>
+          <a:xfrm flipH="1">
+            <a:off x="4326043" y="847431"/>
+            <a:ext cx="342246" cy="2251357"/>
+          </a:xfrm>
+          <a:prstGeom prst="straightConnector1">
+            <a:avLst/>
+          </a:prstGeom>
+          <a:ln>
+            <a:tailEnd type="arrow"/>
+          </a:ln>
+        </p:spPr>
+        <p:style>
+          <a:lnRef idx="2">
+            <a:schemeClr val="accent1"/>
+          </a:lnRef>
+          <a:fillRef idx="0">
+            <a:schemeClr val="accent1"/>
+          </a:fillRef>
+          <a:effectRef idx="1">
+            <a:schemeClr val="accent1"/>
+          </a:effectRef>
+          <a:fontRef idx="minor">
+            <a:schemeClr val="tx1"/>
+          </a:fontRef>
+        </p:style>
+      </p:cxnSp>
+      <p:sp>
+        <p:nvSpPr>
+          <p:cNvPr id="11" name="TextBox 10"/>
+          <p:cNvSpPr txBox="1"/>
+          <p:nvPr/>
+        </p:nvSpPr>
+        <p:spPr>
+          <a:xfrm>
+            <a:off x="3394572" y="5580453"/>
+            <a:ext cx="4553801" cy="646331"/>
+          </a:xfrm>
+          <a:prstGeom prst="rect">
+            <a:avLst/>
+          </a:prstGeom>
+          <a:noFill/>
+        </p:spPr>
+        <p:txBody>
+          <a:bodyPr wrap="none" rtlCol="0">
+            <a:spAutoFit/>
+          </a:bodyPr>
+          <a:lstStyle/>
+          <a:p>
+            <a:r>
+              <a:rPr lang="en-US" sz="3600" dirty="0" smtClean="0"/>
+              <a:t>(NOT CS) AND (NOT IQ)</a:t>
+            </a:r>
+            <a:endParaRPr lang="en-US" sz="3600" dirty="0"/>
+          </a:p>
+        </p:txBody>
+      </p:sp>
+      <p:cxnSp>
+        <p:nvCxnSpPr>
+          <p:cNvPr id="13" name="Straight Arrow Connector 12"/>
+          <p:cNvCxnSpPr>
+            <a:stCxn id="11" idx="0"/>
+          </p:cNvCxnSpPr>
+          <p:nvPr/>
+        </p:nvCxnSpPr>
+        <p:spPr>
+          <a:xfrm flipH="1" flipV="1">
+            <a:off x="4995882" y="4815080"/>
+            <a:ext cx="675591" cy="765373"/>
+          </a:xfrm>
+          <a:prstGeom prst="straightConnector1">
+            <a:avLst/>
+          </a:prstGeom>
+          <a:ln>
+            <a:tailEnd type="arrow"/>
+          </a:ln>
+        </p:spPr>
+        <p:style>
+          <a:lnRef idx="2">
+            <a:schemeClr val="accent1"/>
+          </a:lnRef>
+          <a:fillRef idx="0">
+            <a:schemeClr val="accent1"/>
+          </a:fillRef>
+          <a:effectRef idx="1">
+            <a:schemeClr val="accent1"/>
+          </a:effectRef>
+          <a:fontRef idx="minor">
+            <a:schemeClr val="tx1"/>
+          </a:fontRef>
+        </p:style>
+      </p:cxnSp>
+      <p:sp>
+        <p:nvSpPr>
+          <p:cNvPr id="14" name="TextBox 13"/>
+          <p:cNvSpPr txBox="1"/>
+          <p:nvPr/>
+        </p:nvSpPr>
+        <p:spPr>
+          <a:xfrm>
+            <a:off x="154699" y="757721"/>
+            <a:ext cx="3070071" cy="646331"/>
+          </a:xfrm>
+          <a:prstGeom prst="rect">
+            <a:avLst/>
+          </a:prstGeom>
+          <a:solidFill>
+            <a:srgbClr val="FFFF00"/>
+          </a:solidFill>
+        </p:spPr>
+        <p:txBody>
+          <a:bodyPr wrap="none" rtlCol="0">
+            <a:spAutoFit/>
+          </a:bodyPr>
+          <a:lstStyle/>
+          <a:p>
+            <a:r>
+              <a:rPr lang="en-US" sz="3600" dirty="0" smtClean="0"/>
+              <a:t>CS AND NOT IQ</a:t>
+            </a:r>
+            <a:endParaRPr lang="en-US" sz="3600" dirty="0"/>
+          </a:p>
+        </p:txBody>
+      </p:sp>
+      <p:cxnSp>
+        <p:nvCxnSpPr>
+          <p:cNvPr id="16" name="Straight Arrow Connector 15"/>
+          <p:cNvCxnSpPr>
+            <a:stCxn id="14" idx="2"/>
+          </p:cNvCxnSpPr>
+          <p:nvPr/>
+        </p:nvCxnSpPr>
+        <p:spPr>
+          <a:xfrm>
+            <a:off x="1689735" y="1404052"/>
+            <a:ext cx="1535035" cy="1640773"/>
+          </a:xfrm>
+          <a:prstGeom prst="straightConnector1">
+            <a:avLst/>
+          </a:prstGeom>
+          <a:ln>
+            <a:tailEnd type="arrow"/>
+          </a:ln>
+        </p:spPr>
+        <p:style>
+          <a:lnRef idx="2">
+            <a:schemeClr val="accent1"/>
+          </a:lnRef>
+          <a:fillRef idx="0">
+            <a:schemeClr val="accent1"/>
+          </a:fillRef>
+          <a:effectRef idx="1">
+            <a:schemeClr val="accent1"/>
+          </a:effectRef>
+          <a:fontRef idx="minor">
+            <a:schemeClr val="tx1"/>
+          </a:fontRef>
+        </p:style>
+      </p:cxnSp>
+      <p:sp>
+        <p:nvSpPr>
+          <p:cNvPr id="17" name="TextBox 16"/>
+          <p:cNvSpPr txBox="1"/>
+          <p:nvPr/>
+        </p:nvSpPr>
+        <p:spPr>
+          <a:xfrm>
+            <a:off x="5517369" y="862817"/>
+            <a:ext cx="3352200" cy="646331"/>
+          </a:xfrm>
+          <a:prstGeom prst="rect">
+            <a:avLst/>
+          </a:prstGeom>
+          <a:solidFill>
+            <a:srgbClr val="008000"/>
+          </a:solidFill>
+        </p:spPr>
+        <p:txBody>
+          <a:bodyPr wrap="none" rtlCol="0">
+            <a:spAutoFit/>
+          </a:bodyPr>
+          <a:lstStyle/>
+          <a:p>
+            <a:r>
+              <a:rPr lang="en-US" sz="3600" dirty="0" smtClean="0">
+                <a:solidFill>
+                  <a:schemeClr val="bg1"/>
+                </a:solidFill>
+              </a:rPr>
+              <a:t>(NOT CS) AND IQ</a:t>
+            </a:r>
+            <a:endParaRPr lang="en-US" sz="3600" dirty="0">
+              <a:solidFill>
+                <a:schemeClr val="bg1"/>
+              </a:solidFill>
+            </a:endParaRPr>
+          </a:p>
+        </p:txBody>
+      </p:sp>
+      <p:cxnSp>
+        <p:nvCxnSpPr>
+          <p:cNvPr id="20" name="Straight Arrow Connector 19"/>
+          <p:cNvCxnSpPr>
+            <a:stCxn id="17" idx="2"/>
+          </p:cNvCxnSpPr>
+          <p:nvPr/>
+        </p:nvCxnSpPr>
+        <p:spPr>
+          <a:xfrm flipH="1">
+            <a:off x="5265917" y="1509148"/>
+            <a:ext cx="1927552" cy="1535677"/>
+          </a:xfrm>
+          <a:prstGeom prst="straightConnector1">
+            <a:avLst/>
+          </a:prstGeom>
+          <a:ln>
+            <a:tailEnd type="arrow"/>
+          </a:ln>
+        </p:spPr>
+        <p:style>
+          <a:lnRef idx="2">
+            <a:schemeClr val="accent1"/>
+          </a:lnRef>
+          <a:fillRef idx="0">
+            <a:schemeClr val="accent1"/>
+          </a:fillRef>
+          <a:effectRef idx="1">
+            <a:schemeClr val="accent1"/>
+          </a:effectRef>
+          <a:fontRef idx="minor">
+            <a:schemeClr val="tx1"/>
+          </a:fontRef>
+        </p:style>
+      </p:cxnSp>
+    </p:spTree>
+    <p:extLst>
+      <p:ext uri="{BB962C8B-B14F-4D97-AF65-F5344CB8AC3E}">
+        <p14:creationId xmlns:p14="http://schemas.microsoft.com/office/powerpoint/2010/main" val="1822636299"/>
       </p:ext>
     </p:extLst>
   </p:cSld>

</xml_diff>